<commit_message>
Update 3-13-2020-Program of Studies Meeting.pptx
</commit_message>
<xml_diff>
--- a/files/Doctoral Stuff/3-13-2020-Program of Studies Meeting.pptx
+++ b/files/Doctoral Stuff/3-13-2020-Program of Studies Meeting.pptx
@@ -6604,11 +6604,7 @@
             </a:pPr>
             <a:r>
               <a:rPr lang="en-US" dirty="0" smtClean="0"/>
-              <a:t>Highly sensitive to visible environment inputs</a:t>
-            </a:r>
-            <a:r>
-              <a:rPr lang="en-US" dirty="0" smtClean="0"/>
-              <a:t>  </a:t>
+              <a:t>Highly sensitive to visible environment inputs  </a:t>
             </a:r>
           </a:p>
         </p:txBody>
@@ -6714,11 +6710,7 @@
             </a:r>
             <a:r>
               <a:rPr lang="en-US" dirty="0" smtClean="0"/>
-              <a:t>low speed, and</a:t>
-            </a:r>
-            <a:r>
-              <a:rPr lang="en-US" dirty="0" smtClean="0"/>
-              <a:t> highly concentrated areas </a:t>
+              <a:t>low speed, and highly concentrated areas </a:t>
             </a:r>
           </a:p>
           <a:p>
@@ -6730,7 +6722,6 @@
               <a:rPr lang="en-US" dirty="0" smtClean="0"/>
               <a:t>Inefficient data usage</a:t>
             </a:r>
-            <a:endParaRPr lang="en-US" dirty="0" smtClean="0"/>
           </a:p>
         </p:txBody>
       </p:sp>
@@ -6771,7 +6762,6 @@
               <a:rPr lang="en-US" dirty="0" smtClean="0"/>
               <a:t>Users: Department of Transportation, Research Institutions</a:t>
             </a:r>
-            <a:endParaRPr lang="en-US" dirty="0" smtClean="0"/>
           </a:p>
           <a:p>
             <a:endParaRPr lang="en-US" dirty="0" smtClean="0"/>
@@ -6941,11 +6931,7 @@
             <a:pPr lvl="1"/>
             <a:r>
               <a:rPr lang="en-US" dirty="0" smtClean="0"/>
-              <a:t>Independent of data </a:t>
-            </a:r>
-            <a:r>
-              <a:rPr lang="en-US" dirty="0" smtClean="0"/>
-              <a:t>sources</a:t>
+              <a:t>Independent of data sources</a:t>
             </a:r>
           </a:p>
           <a:p>
@@ -6954,7 +6940,6 @@
               <a:rPr lang="en-US" dirty="0" smtClean="0"/>
               <a:t>Can be generated from more than one data collection method</a:t>
             </a:r>
-            <a:endParaRPr lang="en-US" dirty="0" smtClean="0"/>
           </a:p>
           <a:p>
             <a:pPr lvl="1"/>
@@ -6967,11 +6952,7 @@
             <a:pPr lvl="2"/>
             <a:r>
               <a:rPr lang="en-US" dirty="0" smtClean="0"/>
-              <a:t>Some vehicles are not considered, for example Cargo Trucks, or Double Semi </a:t>
-            </a:r>
-            <a:r>
-              <a:rPr lang="en-US" dirty="0" smtClean="0"/>
-              <a:t>Trucks</a:t>
+              <a:t>Some vehicles are not considered, for example Cargo Trucks, or Double Semi Trucks</a:t>
             </a:r>
           </a:p>
           <a:p>
@@ -7116,11 +7097,7 @@
             <a:pPr lvl="2"/>
             <a:r>
               <a:rPr lang="en-US" dirty="0" smtClean="0"/>
-              <a:t>Review</a:t>
-            </a:r>
-            <a:r>
-              <a:rPr lang="en-US" dirty="0" smtClean="0"/>
-              <a:t> current technology</a:t>
+              <a:t>Review current technology</a:t>
             </a:r>
           </a:p>
           <a:p>
@@ -7152,11 +7129,7 @@
             <a:pPr lvl="1"/>
             <a:r>
               <a:rPr lang="en-US" dirty="0" smtClean="0"/>
-              <a:t>Obtained </a:t>
-            </a:r>
-            <a:r>
-              <a:rPr lang="en-US" dirty="0" smtClean="0"/>
-              <a:t>a framework in which the road profile can be utilized</a:t>
+              <a:t>Obtained a framework in which the road profile can be utilized</a:t>
             </a:r>
           </a:p>
           <a:p>

</xml_diff>